<commit_message>
update support for blocking versions of get_instrument family in g_mh
</commit_message>
<xml_diff>
--- a/ProberControl/docs/user-docs/CoordinateSystem.pptx
+++ b/ProberControl/docs/user-docs/CoordinateSystem.pptx
@@ -6,6 +6,7 @@
   </p:sldMasterIdLst>
   <p:sldIdLst>
     <p:sldId id="256" r:id="rId2"/>
+    <p:sldId id="257" r:id="rId3"/>
   </p:sldIdLst>
   <p:sldSz cx="12192000" cy="6858000"/>
   <p:notesSz cx="6858000" cy="9144000"/>
@@ -243,7 +244,7 @@
           <a:p>
             <a:fld id="{DC7A6A36-33D9-4374-8C8F-A30FFE52BEEE}" type="datetimeFigureOut">
               <a:rPr lang="en-US" smtClean="0"/>
-              <a:t>3/17/2017</a:t>
+              <a:t>3/13/2018</a:t>
             </a:fld>
             <a:endParaRPr lang="en-US"/>
           </a:p>
@@ -413,7 +414,7 @@
           <a:p>
             <a:fld id="{DC7A6A36-33D9-4374-8C8F-A30FFE52BEEE}" type="datetimeFigureOut">
               <a:rPr lang="en-US" smtClean="0"/>
-              <a:t>3/17/2017</a:t>
+              <a:t>3/13/2018</a:t>
             </a:fld>
             <a:endParaRPr lang="en-US"/>
           </a:p>
@@ -593,7 +594,7 @@
           <a:p>
             <a:fld id="{DC7A6A36-33D9-4374-8C8F-A30FFE52BEEE}" type="datetimeFigureOut">
               <a:rPr lang="en-US" smtClean="0"/>
-              <a:t>3/17/2017</a:t>
+              <a:t>3/13/2018</a:t>
             </a:fld>
             <a:endParaRPr lang="en-US"/>
           </a:p>
@@ -763,7 +764,7 @@
           <a:p>
             <a:fld id="{DC7A6A36-33D9-4374-8C8F-A30FFE52BEEE}" type="datetimeFigureOut">
               <a:rPr lang="en-US" smtClean="0"/>
-              <a:t>3/17/2017</a:t>
+              <a:t>3/13/2018</a:t>
             </a:fld>
             <a:endParaRPr lang="en-US"/>
           </a:p>
@@ -1009,7 +1010,7 @@
           <a:p>
             <a:fld id="{DC7A6A36-33D9-4374-8C8F-A30FFE52BEEE}" type="datetimeFigureOut">
               <a:rPr lang="en-US" smtClean="0"/>
-              <a:t>3/17/2017</a:t>
+              <a:t>3/13/2018</a:t>
             </a:fld>
             <a:endParaRPr lang="en-US"/>
           </a:p>
@@ -1241,7 +1242,7 @@
           <a:p>
             <a:fld id="{DC7A6A36-33D9-4374-8C8F-A30FFE52BEEE}" type="datetimeFigureOut">
               <a:rPr lang="en-US" smtClean="0"/>
-              <a:t>3/17/2017</a:t>
+              <a:t>3/13/2018</a:t>
             </a:fld>
             <a:endParaRPr lang="en-US"/>
           </a:p>
@@ -1608,7 +1609,7 @@
           <a:p>
             <a:fld id="{DC7A6A36-33D9-4374-8C8F-A30FFE52BEEE}" type="datetimeFigureOut">
               <a:rPr lang="en-US" smtClean="0"/>
-              <a:t>3/17/2017</a:t>
+              <a:t>3/13/2018</a:t>
             </a:fld>
             <a:endParaRPr lang="en-US"/>
           </a:p>
@@ -1726,7 +1727,7 @@
           <a:p>
             <a:fld id="{DC7A6A36-33D9-4374-8C8F-A30FFE52BEEE}" type="datetimeFigureOut">
               <a:rPr lang="en-US" smtClean="0"/>
-              <a:t>3/17/2017</a:t>
+              <a:t>3/13/2018</a:t>
             </a:fld>
             <a:endParaRPr lang="en-US"/>
           </a:p>
@@ -1821,7 +1822,7 @@
           <a:p>
             <a:fld id="{DC7A6A36-33D9-4374-8C8F-A30FFE52BEEE}" type="datetimeFigureOut">
               <a:rPr lang="en-US" smtClean="0"/>
-              <a:t>3/17/2017</a:t>
+              <a:t>3/13/2018</a:t>
             </a:fld>
             <a:endParaRPr lang="en-US"/>
           </a:p>
@@ -2098,7 +2099,7 @@
           <a:p>
             <a:fld id="{DC7A6A36-33D9-4374-8C8F-A30FFE52BEEE}" type="datetimeFigureOut">
               <a:rPr lang="en-US" smtClean="0"/>
-              <a:t>3/17/2017</a:t>
+              <a:t>3/13/2018</a:t>
             </a:fld>
             <a:endParaRPr lang="en-US"/>
           </a:p>
@@ -2351,7 +2352,7 @@
           <a:p>
             <a:fld id="{DC7A6A36-33D9-4374-8C8F-A30FFE52BEEE}" type="datetimeFigureOut">
               <a:rPr lang="en-US" smtClean="0"/>
-              <a:t>3/17/2017</a:t>
+              <a:t>3/13/2018</a:t>
             </a:fld>
             <a:endParaRPr lang="en-US"/>
           </a:p>
@@ -2564,7 +2565,7 @@
           <a:p>
             <a:fld id="{DC7A6A36-33D9-4374-8C8F-A30FFE52BEEE}" type="datetimeFigureOut">
               <a:rPr lang="en-US" smtClean="0"/>
-              <a:t>3/17/2017</a:t>
+              <a:t>3/13/2018</a:t>
             </a:fld>
             <a:endParaRPr lang="en-US"/>
           </a:p>
@@ -2977,7 +2978,7 @@
         </p:nvSpPr>
         <p:spPr>
           <a:xfrm>
-            <a:off x="3976777" y="1587261"/>
+            <a:off x="4027577" y="2006361"/>
             <a:ext cx="2743200" cy="2743200"/>
           </a:xfrm>
           <a:prstGeom prst="rect">
@@ -3029,7 +3030,7 @@
         </p:nvGrpSpPr>
         <p:grpSpPr>
           <a:xfrm>
-            <a:off x="4893395" y="4490854"/>
+            <a:off x="4944195" y="4909954"/>
             <a:ext cx="1394641" cy="1520156"/>
             <a:chOff x="4893395" y="4490854"/>
             <a:chExt cx="1394641" cy="1520156"/>
@@ -3151,7 +3152,7 @@
         </p:nvGrpSpPr>
         <p:grpSpPr>
           <a:xfrm rot="16200000">
-            <a:off x="7157229" y="2115656"/>
+            <a:off x="7208029" y="2534756"/>
             <a:ext cx="1394641" cy="1520156"/>
             <a:chOff x="4893395" y="4490854"/>
             <a:chExt cx="1394641" cy="1520156"/>
@@ -3273,7 +3274,7 @@
         </p:nvGrpSpPr>
         <p:grpSpPr>
           <a:xfrm rot="10800000">
-            <a:off x="4823584" y="-93288"/>
+            <a:off x="4874384" y="325812"/>
             <a:ext cx="1394641" cy="1520156"/>
             <a:chOff x="4893395" y="4490854"/>
             <a:chExt cx="1394641" cy="1520156"/>
@@ -3395,7 +3396,7 @@
         </p:nvGrpSpPr>
         <p:grpSpPr>
           <a:xfrm rot="5400000">
-            <a:off x="2144883" y="1971225"/>
+            <a:off x="2195683" y="2390325"/>
             <a:ext cx="1394641" cy="1520156"/>
             <a:chOff x="4893395" y="4490854"/>
             <a:chExt cx="1394641" cy="1520156"/>
@@ -3517,7 +3518,7 @@
         </p:nvSpPr>
         <p:spPr>
           <a:xfrm>
-            <a:off x="5348377" y="4973933"/>
+            <a:off x="5399177" y="5393033"/>
             <a:ext cx="290464" cy="369332"/>
           </a:xfrm>
           <a:prstGeom prst="rect">
@@ -3547,7 +3548,7 @@
         </p:nvSpPr>
         <p:spPr>
           <a:xfrm>
-            <a:off x="7468547" y="2740170"/>
+            <a:off x="7519347" y="3159270"/>
             <a:ext cx="296876" cy="369332"/>
           </a:xfrm>
           <a:prstGeom prst="rect">
@@ -3565,7 +3566,6 @@
               <a:rPr lang="en-US" dirty="0"/>
               <a:t>E</a:t>
             </a:r>
-            <a:endParaRPr lang="en-US" dirty="0"/>
           </a:p>
         </p:txBody>
       </p:sp>
@@ -3577,7 +3577,7 @@
         </p:nvSpPr>
         <p:spPr>
           <a:xfrm>
-            <a:off x="5442277" y="562321"/>
+            <a:off x="5493077" y="981421"/>
             <a:ext cx="333746" cy="369332"/>
           </a:xfrm>
           <a:prstGeom prst="rect">
@@ -3607,7 +3607,7 @@
         </p:nvSpPr>
         <p:spPr>
           <a:xfrm>
-            <a:off x="2739612" y="2462464"/>
+            <a:off x="2790412" y="2881564"/>
             <a:ext cx="389850" cy="369332"/>
           </a:xfrm>
           <a:prstGeom prst="rect">
@@ -3625,6 +3625,125 @@
               <a:rPr lang="en-US" dirty="0"/>
               <a:t>W</a:t>
             </a:r>
+          </a:p>
+        </p:txBody>
+      </p:sp>
+      <p:sp>
+        <p:nvSpPr>
+          <p:cNvPr id="23" name="TextBox 22"/>
+          <p:cNvSpPr txBox="1"/>
+          <p:nvPr/>
+        </p:nvSpPr>
+        <p:spPr>
+          <a:xfrm>
+            <a:off x="5888072" y="6060778"/>
+            <a:ext cx="617477" cy="369332"/>
+          </a:xfrm>
+          <a:prstGeom prst="rect">
+            <a:avLst/>
+          </a:prstGeom>
+          <a:noFill/>
+        </p:spPr>
+        <p:txBody>
+          <a:bodyPr wrap="none" rtlCol="0">
+            <a:spAutoFit/>
+          </a:bodyPr>
+          <a:lstStyle/>
+          <a:p>
+            <a:r>
+              <a:rPr lang="en-US" dirty="0" smtClean="0"/>
+              <a:t>(0,0)</a:t>
+            </a:r>
+            <a:endParaRPr lang="en-US" dirty="0"/>
+          </a:p>
+        </p:txBody>
+      </p:sp>
+      <p:sp>
+        <p:nvSpPr>
+          <p:cNvPr id="24" name="TextBox 23"/>
+          <p:cNvSpPr txBox="1"/>
+          <p:nvPr/>
+        </p:nvSpPr>
+        <p:spPr>
+          <a:xfrm rot="16200000">
+            <a:off x="8172024" y="2519373"/>
+            <a:ext cx="617477" cy="369332"/>
+          </a:xfrm>
+          <a:prstGeom prst="rect">
+            <a:avLst/>
+          </a:prstGeom>
+          <a:noFill/>
+        </p:spPr>
+        <p:txBody>
+          <a:bodyPr wrap="none" rtlCol="0">
+            <a:spAutoFit/>
+          </a:bodyPr>
+          <a:lstStyle/>
+          <a:p>
+            <a:r>
+              <a:rPr lang="en-US" dirty="0" smtClean="0"/>
+              <a:t>(0,0)</a:t>
+            </a:r>
+            <a:endParaRPr lang="en-US" dirty="0"/>
+          </a:p>
+        </p:txBody>
+      </p:sp>
+      <p:sp>
+        <p:nvSpPr>
+          <p:cNvPr id="25" name="TextBox 24"/>
+          <p:cNvSpPr txBox="1"/>
+          <p:nvPr/>
+        </p:nvSpPr>
+        <p:spPr>
+          <a:xfrm>
+            <a:off x="4798822" y="359173"/>
+            <a:ext cx="617477" cy="369332"/>
+          </a:xfrm>
+          <a:prstGeom prst="rect">
+            <a:avLst/>
+          </a:prstGeom>
+          <a:noFill/>
+        </p:spPr>
+        <p:txBody>
+          <a:bodyPr wrap="none" rtlCol="0">
+            <a:spAutoFit/>
+          </a:bodyPr>
+          <a:lstStyle/>
+          <a:p>
+            <a:r>
+              <a:rPr lang="en-US" dirty="0" smtClean="0"/>
+              <a:t>(0,0)</a:t>
+            </a:r>
+            <a:endParaRPr lang="en-US" dirty="0"/>
+          </a:p>
+        </p:txBody>
+      </p:sp>
+      <p:sp>
+        <p:nvSpPr>
+          <p:cNvPr id="26" name="TextBox 25"/>
+          <p:cNvSpPr txBox="1"/>
+          <p:nvPr/>
+        </p:nvSpPr>
+        <p:spPr>
+          <a:xfrm rot="5400000">
+            <a:off x="2027686" y="3454932"/>
+            <a:ext cx="617477" cy="369332"/>
+          </a:xfrm>
+          <a:prstGeom prst="rect">
+            <a:avLst/>
+          </a:prstGeom>
+          <a:noFill/>
+        </p:spPr>
+        <p:txBody>
+          <a:bodyPr wrap="none" rtlCol="0">
+            <a:spAutoFit/>
+          </a:bodyPr>
+          <a:lstStyle/>
+          <a:p>
+            <a:r>
+              <a:rPr lang="en-US" dirty="0" smtClean="0"/>
+              <a:t>(0,0)</a:t>
+            </a:r>
             <a:endParaRPr lang="en-US" dirty="0"/>
           </a:p>
         </p:txBody>
@@ -3633,6 +3752,1881 @@
     <p:extLst>
       <p:ext uri="{BB962C8B-B14F-4D97-AF65-F5344CB8AC3E}">
         <p14:creationId xmlns:p14="http://schemas.microsoft.com/office/powerpoint/2010/main" val="3921424759"/>
+      </p:ext>
+    </p:extLst>
+  </p:cSld>
+  <p:clrMapOvr>
+    <a:masterClrMapping/>
+  </p:clrMapOvr>
+</p:sld>
+</file>
+
+<file path=ppt/slides/slide2.xml><?xml version="1.0" encoding="utf-8"?>
+<p:sld xmlns:a="http://schemas.openxmlformats.org/drawingml/2006/main" xmlns:r="http://schemas.openxmlformats.org/officeDocument/2006/relationships" xmlns:p="http://schemas.openxmlformats.org/presentationml/2006/main">
+  <p:cSld>
+    <p:spTree>
+      <p:nvGrpSpPr>
+        <p:cNvPr id="1" name=""/>
+        <p:cNvGrpSpPr/>
+        <p:nvPr/>
+      </p:nvGrpSpPr>
+      <p:grpSpPr>
+        <a:xfrm>
+          <a:off x="0" y="0"/>
+          <a:ext cx="0" cy="0"/>
+          <a:chOff x="0" y="0"/>
+          <a:chExt cx="0" cy="0"/>
+        </a:xfrm>
+      </p:grpSpPr>
+      <p:sp>
+        <p:nvSpPr>
+          <p:cNvPr id="15" name="Rectangle 14"/>
+          <p:cNvSpPr/>
+          <p:nvPr/>
+        </p:nvSpPr>
+        <p:spPr>
+          <a:xfrm>
+            <a:off x="1668763" y="838200"/>
+            <a:ext cx="2743200" cy="2743200"/>
+          </a:xfrm>
+          <a:prstGeom prst="rect">
+            <a:avLst/>
+          </a:prstGeom>
+        </p:spPr>
+        <p:style>
+          <a:lnRef idx="2">
+            <a:schemeClr val="accent2">
+              <a:shade val="50000"/>
+            </a:schemeClr>
+          </a:lnRef>
+          <a:fillRef idx="1">
+            <a:schemeClr val="accent2"/>
+          </a:fillRef>
+          <a:effectRef idx="0">
+            <a:schemeClr val="accent2"/>
+          </a:effectRef>
+          <a:fontRef idx="minor">
+            <a:schemeClr val="lt1"/>
+          </a:fontRef>
+        </p:style>
+        <p:txBody>
+          <a:bodyPr rtlCol="0" anchor="ctr"/>
+          <a:lstStyle/>
+          <a:p>
+            <a:pPr algn="ctr"/>
+            <a:endParaRPr lang="en-US"/>
+          </a:p>
+        </p:txBody>
+      </p:sp>
+      <p:grpSp>
+        <p:nvGrpSpPr>
+          <p:cNvPr id="24" name="Group 23"/>
+          <p:cNvGrpSpPr/>
+          <p:nvPr/>
+        </p:nvGrpSpPr>
+        <p:grpSpPr>
+          <a:xfrm>
+            <a:off x="2184448" y="3213100"/>
+            <a:ext cx="1816100" cy="2632911"/>
+            <a:chOff x="4851448" y="3644900"/>
+            <a:chExt cx="1816100" cy="2632911"/>
+          </a:xfrm>
+        </p:grpSpPr>
+        <p:sp>
+          <p:nvSpPr>
+            <p:cNvPr id="4" name="Rectangle 3"/>
+            <p:cNvSpPr/>
+            <p:nvPr/>
+          </p:nvSpPr>
+          <p:spPr>
+            <a:xfrm>
+              <a:off x="4851448" y="3644900"/>
+              <a:ext cx="1816100" cy="2632911"/>
+            </a:xfrm>
+            <a:prstGeom prst="rect">
+              <a:avLst/>
+            </a:prstGeom>
+            <a:gradFill flip="none" rotWithShape="1">
+              <a:gsLst>
+                <a:gs pos="0">
+                  <a:schemeClr val="accent1">
+                    <a:lumMod val="67000"/>
+                  </a:schemeClr>
+                </a:gs>
+                <a:gs pos="48000">
+                  <a:schemeClr val="accent1">
+                    <a:lumMod val="97000"/>
+                    <a:lumOff val="3000"/>
+                  </a:schemeClr>
+                </a:gs>
+                <a:gs pos="100000">
+                  <a:schemeClr val="accent1">
+                    <a:lumMod val="60000"/>
+                    <a:lumOff val="40000"/>
+                  </a:schemeClr>
+                </a:gs>
+              </a:gsLst>
+              <a:lin ang="16200000" scaled="1"/>
+              <a:tileRect/>
+            </a:gradFill>
+            <a:ln>
+              <a:noFill/>
+            </a:ln>
+          </p:spPr>
+          <p:style>
+            <a:lnRef idx="0">
+              <a:scrgbClr r="0" g="0" b="0"/>
+            </a:lnRef>
+            <a:fillRef idx="0">
+              <a:scrgbClr r="0" g="0" b="0"/>
+            </a:fillRef>
+            <a:effectRef idx="0">
+              <a:scrgbClr r="0" g="0" b="0"/>
+            </a:effectRef>
+            <a:fontRef idx="minor">
+              <a:schemeClr val="lt1"/>
+            </a:fontRef>
+          </p:style>
+          <p:txBody>
+            <a:bodyPr rtlCol="0" anchor="ctr"/>
+            <a:lstStyle/>
+            <a:p>
+              <a:pPr algn="ctr"/>
+              <a:endParaRPr lang="en-US"/>
+            </a:p>
+          </p:txBody>
+        </p:sp>
+        <p:sp>
+          <p:nvSpPr>
+            <p:cNvPr id="5" name="Rectangle 4"/>
+            <p:cNvSpPr/>
+            <p:nvPr/>
+          </p:nvSpPr>
+          <p:spPr>
+            <a:xfrm>
+              <a:off x="5033927" y="3644900"/>
+              <a:ext cx="52137" cy="2346158"/>
+            </a:xfrm>
+            <a:prstGeom prst="rect">
+              <a:avLst/>
+            </a:prstGeom>
+          </p:spPr>
+          <p:style>
+            <a:lnRef idx="2">
+              <a:schemeClr val="dk1">
+                <a:shade val="50000"/>
+              </a:schemeClr>
+            </a:lnRef>
+            <a:fillRef idx="1">
+              <a:schemeClr val="dk1"/>
+            </a:fillRef>
+            <a:effectRef idx="0">
+              <a:schemeClr val="dk1"/>
+            </a:effectRef>
+            <a:fontRef idx="minor">
+              <a:schemeClr val="lt1"/>
+            </a:fontRef>
+          </p:style>
+          <p:txBody>
+            <a:bodyPr rtlCol="0" anchor="ctr"/>
+            <a:lstStyle/>
+            <a:p>
+              <a:pPr algn="ctr"/>
+              <a:endParaRPr lang="en-US"/>
+            </a:p>
+          </p:txBody>
+        </p:sp>
+        <p:sp>
+          <p:nvSpPr>
+            <p:cNvPr id="6" name="Rectangle 5"/>
+            <p:cNvSpPr/>
+            <p:nvPr/>
+          </p:nvSpPr>
+          <p:spPr>
+            <a:xfrm>
+              <a:off x="5226337" y="3644900"/>
+              <a:ext cx="52137" cy="2346158"/>
+            </a:xfrm>
+            <a:prstGeom prst="rect">
+              <a:avLst/>
+            </a:prstGeom>
+          </p:spPr>
+          <p:style>
+            <a:lnRef idx="2">
+              <a:schemeClr val="dk1">
+                <a:shade val="50000"/>
+              </a:schemeClr>
+            </a:lnRef>
+            <a:fillRef idx="1">
+              <a:schemeClr val="dk1"/>
+            </a:fillRef>
+            <a:effectRef idx="0">
+              <a:schemeClr val="dk1"/>
+            </a:effectRef>
+            <a:fontRef idx="minor">
+              <a:schemeClr val="lt1"/>
+            </a:fontRef>
+          </p:style>
+          <p:txBody>
+            <a:bodyPr rtlCol="0" anchor="ctr"/>
+            <a:lstStyle/>
+            <a:p>
+              <a:pPr algn="ctr"/>
+              <a:endParaRPr lang="en-US"/>
+            </a:p>
+          </p:txBody>
+        </p:sp>
+        <p:sp>
+          <p:nvSpPr>
+            <p:cNvPr id="7" name="Rectangle 6"/>
+            <p:cNvSpPr/>
+            <p:nvPr/>
+          </p:nvSpPr>
+          <p:spPr>
+            <a:xfrm>
+              <a:off x="5418747" y="3644900"/>
+              <a:ext cx="52137" cy="2346158"/>
+            </a:xfrm>
+            <a:prstGeom prst="rect">
+              <a:avLst/>
+            </a:prstGeom>
+          </p:spPr>
+          <p:style>
+            <a:lnRef idx="2">
+              <a:schemeClr val="dk1">
+                <a:shade val="50000"/>
+              </a:schemeClr>
+            </a:lnRef>
+            <a:fillRef idx="1">
+              <a:schemeClr val="dk1"/>
+            </a:fillRef>
+            <a:effectRef idx="0">
+              <a:schemeClr val="dk1"/>
+            </a:effectRef>
+            <a:fontRef idx="minor">
+              <a:schemeClr val="lt1"/>
+            </a:fontRef>
+          </p:style>
+          <p:txBody>
+            <a:bodyPr rtlCol="0" anchor="ctr"/>
+            <a:lstStyle/>
+            <a:p>
+              <a:pPr algn="ctr"/>
+              <a:endParaRPr lang="en-US"/>
+            </a:p>
+          </p:txBody>
+        </p:sp>
+        <p:sp>
+          <p:nvSpPr>
+            <p:cNvPr id="8" name="Rectangle 7"/>
+            <p:cNvSpPr/>
+            <p:nvPr/>
+          </p:nvSpPr>
+          <p:spPr>
+            <a:xfrm>
+              <a:off x="5611157" y="3644900"/>
+              <a:ext cx="52137" cy="2346158"/>
+            </a:xfrm>
+            <a:prstGeom prst="rect">
+              <a:avLst/>
+            </a:prstGeom>
+          </p:spPr>
+          <p:style>
+            <a:lnRef idx="2">
+              <a:schemeClr val="dk1">
+                <a:shade val="50000"/>
+              </a:schemeClr>
+            </a:lnRef>
+            <a:fillRef idx="1">
+              <a:schemeClr val="dk1"/>
+            </a:fillRef>
+            <a:effectRef idx="0">
+              <a:schemeClr val="dk1"/>
+            </a:effectRef>
+            <a:fontRef idx="minor">
+              <a:schemeClr val="lt1"/>
+            </a:fontRef>
+          </p:style>
+          <p:txBody>
+            <a:bodyPr rtlCol="0" anchor="ctr"/>
+            <a:lstStyle/>
+            <a:p>
+              <a:pPr algn="ctr"/>
+              <a:endParaRPr lang="en-US"/>
+            </a:p>
+          </p:txBody>
+        </p:sp>
+        <p:sp>
+          <p:nvSpPr>
+            <p:cNvPr id="10" name="Rectangle 9"/>
+            <p:cNvSpPr/>
+            <p:nvPr/>
+          </p:nvSpPr>
+          <p:spPr>
+            <a:xfrm>
+              <a:off x="5803567" y="3644900"/>
+              <a:ext cx="52137" cy="2346158"/>
+            </a:xfrm>
+            <a:prstGeom prst="rect">
+              <a:avLst/>
+            </a:prstGeom>
+          </p:spPr>
+          <p:style>
+            <a:lnRef idx="2">
+              <a:schemeClr val="dk1">
+                <a:shade val="50000"/>
+              </a:schemeClr>
+            </a:lnRef>
+            <a:fillRef idx="1">
+              <a:schemeClr val="dk1"/>
+            </a:fillRef>
+            <a:effectRef idx="0">
+              <a:schemeClr val="dk1"/>
+            </a:effectRef>
+            <a:fontRef idx="minor">
+              <a:schemeClr val="lt1"/>
+            </a:fontRef>
+          </p:style>
+          <p:txBody>
+            <a:bodyPr rtlCol="0" anchor="ctr"/>
+            <a:lstStyle/>
+            <a:p>
+              <a:pPr algn="ctr"/>
+              <a:endParaRPr lang="en-US"/>
+            </a:p>
+          </p:txBody>
+        </p:sp>
+        <p:sp>
+          <p:nvSpPr>
+            <p:cNvPr id="11" name="Rectangle 10"/>
+            <p:cNvSpPr/>
+            <p:nvPr/>
+          </p:nvSpPr>
+          <p:spPr>
+            <a:xfrm>
+              <a:off x="5995977" y="3644900"/>
+              <a:ext cx="52137" cy="2346158"/>
+            </a:xfrm>
+            <a:prstGeom prst="rect">
+              <a:avLst/>
+            </a:prstGeom>
+          </p:spPr>
+          <p:style>
+            <a:lnRef idx="2">
+              <a:schemeClr val="dk1">
+                <a:shade val="50000"/>
+              </a:schemeClr>
+            </a:lnRef>
+            <a:fillRef idx="1">
+              <a:schemeClr val="dk1"/>
+            </a:fillRef>
+            <a:effectRef idx="0">
+              <a:schemeClr val="dk1"/>
+            </a:effectRef>
+            <a:fontRef idx="minor">
+              <a:schemeClr val="lt1"/>
+            </a:fontRef>
+          </p:style>
+          <p:txBody>
+            <a:bodyPr rtlCol="0" anchor="ctr"/>
+            <a:lstStyle/>
+            <a:p>
+              <a:pPr algn="ctr"/>
+              <a:endParaRPr lang="en-US"/>
+            </a:p>
+          </p:txBody>
+        </p:sp>
+        <p:sp>
+          <p:nvSpPr>
+            <p:cNvPr id="12" name="Rectangle 11"/>
+            <p:cNvSpPr/>
+            <p:nvPr/>
+          </p:nvSpPr>
+          <p:spPr>
+            <a:xfrm>
+              <a:off x="6188387" y="3644900"/>
+              <a:ext cx="52137" cy="2346158"/>
+            </a:xfrm>
+            <a:prstGeom prst="rect">
+              <a:avLst/>
+            </a:prstGeom>
+          </p:spPr>
+          <p:style>
+            <a:lnRef idx="2">
+              <a:schemeClr val="dk1">
+                <a:shade val="50000"/>
+              </a:schemeClr>
+            </a:lnRef>
+            <a:fillRef idx="1">
+              <a:schemeClr val="dk1"/>
+            </a:fillRef>
+            <a:effectRef idx="0">
+              <a:schemeClr val="dk1"/>
+            </a:effectRef>
+            <a:fontRef idx="minor">
+              <a:schemeClr val="lt1"/>
+            </a:fontRef>
+          </p:style>
+          <p:txBody>
+            <a:bodyPr rtlCol="0" anchor="ctr"/>
+            <a:lstStyle/>
+            <a:p>
+              <a:pPr algn="ctr"/>
+              <a:endParaRPr lang="en-US"/>
+            </a:p>
+          </p:txBody>
+        </p:sp>
+        <p:sp>
+          <p:nvSpPr>
+            <p:cNvPr id="13" name="Rectangle 12"/>
+            <p:cNvSpPr/>
+            <p:nvPr/>
+          </p:nvSpPr>
+          <p:spPr>
+            <a:xfrm>
+              <a:off x="6380795" y="3644900"/>
+              <a:ext cx="52137" cy="2346158"/>
+            </a:xfrm>
+            <a:prstGeom prst="rect">
+              <a:avLst/>
+            </a:prstGeom>
+          </p:spPr>
+          <p:style>
+            <a:lnRef idx="2">
+              <a:schemeClr val="dk1">
+                <a:shade val="50000"/>
+              </a:schemeClr>
+            </a:lnRef>
+            <a:fillRef idx="1">
+              <a:schemeClr val="dk1"/>
+            </a:fillRef>
+            <a:effectRef idx="0">
+              <a:schemeClr val="dk1"/>
+            </a:effectRef>
+            <a:fontRef idx="minor">
+              <a:schemeClr val="lt1"/>
+            </a:fontRef>
+          </p:style>
+          <p:txBody>
+            <a:bodyPr rtlCol="0" anchor="ctr"/>
+            <a:lstStyle/>
+            <a:p>
+              <a:pPr algn="ctr"/>
+              <a:endParaRPr lang="en-US"/>
+            </a:p>
+          </p:txBody>
+        </p:sp>
+      </p:grpSp>
+      <p:sp>
+        <p:nvSpPr>
+          <p:cNvPr id="16" name="Isosceles Triangle 15"/>
+          <p:cNvSpPr/>
+          <p:nvPr/>
+        </p:nvSpPr>
+        <p:spPr>
+          <a:xfrm>
+            <a:off x="2316795" y="2810377"/>
+            <a:ext cx="152400" cy="304800"/>
+          </a:xfrm>
+          <a:prstGeom prst="triangle">
+            <a:avLst/>
+          </a:prstGeom>
+        </p:spPr>
+        <p:style>
+          <a:lnRef idx="2">
+            <a:schemeClr val="accent6">
+              <a:shade val="50000"/>
+            </a:schemeClr>
+          </a:lnRef>
+          <a:fillRef idx="1">
+            <a:schemeClr val="accent6"/>
+          </a:fillRef>
+          <a:effectRef idx="0">
+            <a:schemeClr val="accent6"/>
+          </a:effectRef>
+          <a:fontRef idx="minor">
+            <a:schemeClr val="lt1"/>
+          </a:fontRef>
+        </p:style>
+        <p:txBody>
+          <a:bodyPr rtlCol="0" anchor="ctr"/>
+          <a:lstStyle/>
+          <a:p>
+            <a:pPr algn="ctr"/>
+            <a:endParaRPr lang="en-US"/>
+          </a:p>
+        </p:txBody>
+      </p:sp>
+      <p:sp>
+        <p:nvSpPr>
+          <p:cNvPr id="17" name="Isosceles Triangle 16"/>
+          <p:cNvSpPr/>
+          <p:nvPr/>
+        </p:nvSpPr>
+        <p:spPr>
+          <a:xfrm>
+            <a:off x="2509205" y="2810377"/>
+            <a:ext cx="152400" cy="304800"/>
+          </a:xfrm>
+          <a:prstGeom prst="triangle">
+            <a:avLst/>
+          </a:prstGeom>
+        </p:spPr>
+        <p:style>
+          <a:lnRef idx="2">
+            <a:schemeClr val="accent6">
+              <a:shade val="50000"/>
+            </a:schemeClr>
+          </a:lnRef>
+          <a:fillRef idx="1">
+            <a:schemeClr val="accent6"/>
+          </a:fillRef>
+          <a:effectRef idx="0">
+            <a:schemeClr val="accent6"/>
+          </a:effectRef>
+          <a:fontRef idx="minor">
+            <a:schemeClr val="lt1"/>
+          </a:fontRef>
+        </p:style>
+        <p:txBody>
+          <a:bodyPr rtlCol="0" anchor="ctr"/>
+          <a:lstStyle/>
+          <a:p>
+            <a:pPr algn="ctr"/>
+            <a:endParaRPr lang="en-US"/>
+          </a:p>
+        </p:txBody>
+      </p:sp>
+      <p:sp>
+        <p:nvSpPr>
+          <p:cNvPr id="18" name="Isosceles Triangle 17"/>
+          <p:cNvSpPr/>
+          <p:nvPr/>
+        </p:nvSpPr>
+        <p:spPr>
+          <a:xfrm>
+            <a:off x="2701615" y="2810377"/>
+            <a:ext cx="152400" cy="304800"/>
+          </a:xfrm>
+          <a:prstGeom prst="triangle">
+            <a:avLst/>
+          </a:prstGeom>
+        </p:spPr>
+        <p:style>
+          <a:lnRef idx="2">
+            <a:schemeClr val="accent6">
+              <a:shade val="50000"/>
+            </a:schemeClr>
+          </a:lnRef>
+          <a:fillRef idx="1">
+            <a:schemeClr val="accent6"/>
+          </a:fillRef>
+          <a:effectRef idx="0">
+            <a:schemeClr val="accent6"/>
+          </a:effectRef>
+          <a:fontRef idx="minor">
+            <a:schemeClr val="lt1"/>
+          </a:fontRef>
+        </p:style>
+        <p:txBody>
+          <a:bodyPr rtlCol="0" anchor="ctr"/>
+          <a:lstStyle/>
+          <a:p>
+            <a:pPr algn="ctr"/>
+            <a:endParaRPr lang="en-US"/>
+          </a:p>
+        </p:txBody>
+      </p:sp>
+      <p:sp>
+        <p:nvSpPr>
+          <p:cNvPr id="19" name="Isosceles Triangle 18"/>
+          <p:cNvSpPr/>
+          <p:nvPr/>
+        </p:nvSpPr>
+        <p:spPr>
+          <a:xfrm>
+            <a:off x="2894025" y="2810377"/>
+            <a:ext cx="152400" cy="304800"/>
+          </a:xfrm>
+          <a:prstGeom prst="triangle">
+            <a:avLst/>
+          </a:prstGeom>
+        </p:spPr>
+        <p:style>
+          <a:lnRef idx="2">
+            <a:schemeClr val="accent6">
+              <a:shade val="50000"/>
+            </a:schemeClr>
+          </a:lnRef>
+          <a:fillRef idx="1">
+            <a:schemeClr val="accent6"/>
+          </a:fillRef>
+          <a:effectRef idx="0">
+            <a:schemeClr val="accent6"/>
+          </a:effectRef>
+          <a:fontRef idx="minor">
+            <a:schemeClr val="lt1"/>
+          </a:fontRef>
+        </p:style>
+        <p:txBody>
+          <a:bodyPr rtlCol="0" anchor="ctr"/>
+          <a:lstStyle/>
+          <a:p>
+            <a:pPr algn="ctr"/>
+            <a:endParaRPr lang="en-US"/>
+          </a:p>
+        </p:txBody>
+      </p:sp>
+      <p:sp>
+        <p:nvSpPr>
+          <p:cNvPr id="20" name="Isosceles Triangle 19"/>
+          <p:cNvSpPr/>
+          <p:nvPr/>
+        </p:nvSpPr>
+        <p:spPr>
+          <a:xfrm>
+            <a:off x="3086435" y="2810377"/>
+            <a:ext cx="152400" cy="304800"/>
+          </a:xfrm>
+          <a:prstGeom prst="triangle">
+            <a:avLst/>
+          </a:prstGeom>
+        </p:spPr>
+        <p:style>
+          <a:lnRef idx="2">
+            <a:schemeClr val="accent6">
+              <a:shade val="50000"/>
+            </a:schemeClr>
+          </a:lnRef>
+          <a:fillRef idx="1">
+            <a:schemeClr val="accent6"/>
+          </a:fillRef>
+          <a:effectRef idx="0">
+            <a:schemeClr val="accent6"/>
+          </a:effectRef>
+          <a:fontRef idx="minor">
+            <a:schemeClr val="lt1"/>
+          </a:fontRef>
+        </p:style>
+        <p:txBody>
+          <a:bodyPr rtlCol="0" anchor="ctr"/>
+          <a:lstStyle/>
+          <a:p>
+            <a:pPr algn="ctr"/>
+            <a:endParaRPr lang="en-US"/>
+          </a:p>
+        </p:txBody>
+      </p:sp>
+      <p:sp>
+        <p:nvSpPr>
+          <p:cNvPr id="21" name="Isosceles Triangle 20"/>
+          <p:cNvSpPr/>
+          <p:nvPr/>
+        </p:nvSpPr>
+        <p:spPr>
+          <a:xfrm>
+            <a:off x="3278845" y="2810377"/>
+            <a:ext cx="152400" cy="304800"/>
+          </a:xfrm>
+          <a:prstGeom prst="triangle">
+            <a:avLst/>
+          </a:prstGeom>
+        </p:spPr>
+        <p:style>
+          <a:lnRef idx="2">
+            <a:schemeClr val="accent6">
+              <a:shade val="50000"/>
+            </a:schemeClr>
+          </a:lnRef>
+          <a:fillRef idx="1">
+            <a:schemeClr val="accent6"/>
+          </a:fillRef>
+          <a:effectRef idx="0">
+            <a:schemeClr val="accent6"/>
+          </a:effectRef>
+          <a:fontRef idx="minor">
+            <a:schemeClr val="lt1"/>
+          </a:fontRef>
+        </p:style>
+        <p:txBody>
+          <a:bodyPr rtlCol="0" anchor="ctr"/>
+          <a:lstStyle/>
+          <a:p>
+            <a:pPr algn="ctr"/>
+            <a:endParaRPr lang="en-US"/>
+          </a:p>
+        </p:txBody>
+      </p:sp>
+      <p:sp>
+        <p:nvSpPr>
+          <p:cNvPr id="22" name="Isosceles Triangle 21"/>
+          <p:cNvSpPr/>
+          <p:nvPr/>
+        </p:nvSpPr>
+        <p:spPr>
+          <a:xfrm>
+            <a:off x="3471255" y="2810377"/>
+            <a:ext cx="152400" cy="304800"/>
+          </a:xfrm>
+          <a:prstGeom prst="triangle">
+            <a:avLst/>
+          </a:prstGeom>
+        </p:spPr>
+        <p:style>
+          <a:lnRef idx="2">
+            <a:schemeClr val="accent6">
+              <a:shade val="50000"/>
+            </a:schemeClr>
+          </a:lnRef>
+          <a:fillRef idx="1">
+            <a:schemeClr val="accent6"/>
+          </a:fillRef>
+          <a:effectRef idx="0">
+            <a:schemeClr val="accent6"/>
+          </a:effectRef>
+          <a:fontRef idx="minor">
+            <a:schemeClr val="lt1"/>
+          </a:fontRef>
+        </p:style>
+        <p:txBody>
+          <a:bodyPr rtlCol="0" anchor="ctr"/>
+          <a:lstStyle/>
+          <a:p>
+            <a:pPr algn="ctr"/>
+            <a:endParaRPr lang="en-US"/>
+          </a:p>
+        </p:txBody>
+      </p:sp>
+      <p:sp>
+        <p:nvSpPr>
+          <p:cNvPr id="23" name="Isosceles Triangle 22"/>
+          <p:cNvSpPr/>
+          <p:nvPr/>
+        </p:nvSpPr>
+        <p:spPr>
+          <a:xfrm>
+            <a:off x="3663663" y="2810377"/>
+            <a:ext cx="152400" cy="304800"/>
+          </a:xfrm>
+          <a:prstGeom prst="triangle">
+            <a:avLst/>
+          </a:prstGeom>
+        </p:spPr>
+        <p:style>
+          <a:lnRef idx="2">
+            <a:schemeClr val="accent6">
+              <a:shade val="50000"/>
+            </a:schemeClr>
+          </a:lnRef>
+          <a:fillRef idx="1">
+            <a:schemeClr val="accent6"/>
+          </a:fillRef>
+          <a:effectRef idx="0">
+            <a:schemeClr val="accent6"/>
+          </a:effectRef>
+          <a:fontRef idx="minor">
+            <a:schemeClr val="lt1"/>
+          </a:fontRef>
+        </p:style>
+        <p:txBody>
+          <a:bodyPr rtlCol="0" anchor="ctr"/>
+          <a:lstStyle/>
+          <a:p>
+            <a:pPr algn="ctr"/>
+            <a:endParaRPr lang="en-US"/>
+          </a:p>
+        </p:txBody>
+      </p:sp>
+      <p:sp>
+        <p:nvSpPr>
+          <p:cNvPr id="25" name="TextBox 24"/>
+          <p:cNvSpPr txBox="1"/>
+          <p:nvPr/>
+        </p:nvSpPr>
+        <p:spPr>
+          <a:xfrm>
+            <a:off x="319405" y="4201970"/>
+            <a:ext cx="1542602" cy="369332"/>
+          </a:xfrm>
+          <a:prstGeom prst="rect">
+            <a:avLst/>
+          </a:prstGeom>
+          <a:noFill/>
+        </p:spPr>
+        <p:txBody>
+          <a:bodyPr wrap="none" rtlCol="0">
+            <a:spAutoFit/>
+          </a:bodyPr>
+          <a:lstStyle/>
+          <a:p>
+            <a:r>
+              <a:rPr lang="en-US" dirty="0" smtClean="0"/>
+              <a:t>Leftmost Fiber</a:t>
+            </a:r>
+            <a:endParaRPr lang="en-US" dirty="0"/>
+          </a:p>
+        </p:txBody>
+      </p:sp>
+      <p:cxnSp>
+        <p:nvCxnSpPr>
+          <p:cNvPr id="27" name="Straight Arrow Connector 26"/>
+          <p:cNvCxnSpPr/>
+          <p:nvPr/>
+        </p:nvCxnSpPr>
+        <p:spPr>
+          <a:xfrm flipV="1">
+            <a:off x="1872209" y="4386179"/>
+            <a:ext cx="456618" cy="457"/>
+          </a:xfrm>
+          <a:prstGeom prst="straightConnector1">
+            <a:avLst/>
+          </a:prstGeom>
+          <a:ln>
+            <a:tailEnd type="triangle"/>
+          </a:ln>
+        </p:spPr>
+        <p:style>
+          <a:lnRef idx="3">
+            <a:schemeClr val="dk1"/>
+          </a:lnRef>
+          <a:fillRef idx="0">
+            <a:schemeClr val="dk1"/>
+          </a:fillRef>
+          <a:effectRef idx="2">
+            <a:schemeClr val="dk1"/>
+          </a:effectRef>
+          <a:fontRef idx="minor">
+            <a:schemeClr val="tx1"/>
+          </a:fontRef>
+        </p:style>
+      </p:cxnSp>
+      <p:sp>
+        <p:nvSpPr>
+          <p:cNvPr id="28" name="TextBox 27"/>
+          <p:cNvSpPr txBox="1"/>
+          <p:nvPr/>
+        </p:nvSpPr>
+        <p:spPr>
+          <a:xfrm>
+            <a:off x="319405" y="2653512"/>
+            <a:ext cx="2061590" cy="369332"/>
+          </a:xfrm>
+          <a:prstGeom prst="rect">
+            <a:avLst/>
+          </a:prstGeom>
+          <a:noFill/>
+        </p:spPr>
+        <p:txBody>
+          <a:bodyPr wrap="none" rtlCol="0">
+            <a:spAutoFit/>
+          </a:bodyPr>
+          <a:lstStyle/>
+          <a:p>
+            <a:r>
+              <a:rPr lang="en-US" dirty="0" smtClean="0"/>
+              <a:t>Defining Coordinate</a:t>
+            </a:r>
+            <a:endParaRPr lang="en-US" dirty="0"/>
+          </a:p>
+        </p:txBody>
+      </p:sp>
+      <p:cxnSp>
+        <p:nvCxnSpPr>
+          <p:cNvPr id="29" name="Straight Arrow Connector 28"/>
+          <p:cNvCxnSpPr/>
+          <p:nvPr/>
+        </p:nvCxnSpPr>
+        <p:spPr>
+          <a:xfrm flipV="1">
+            <a:off x="1925337" y="3027977"/>
+            <a:ext cx="456618" cy="457"/>
+          </a:xfrm>
+          <a:prstGeom prst="straightConnector1">
+            <a:avLst/>
+          </a:prstGeom>
+          <a:ln>
+            <a:tailEnd type="triangle"/>
+          </a:ln>
+        </p:spPr>
+        <p:style>
+          <a:lnRef idx="3">
+            <a:schemeClr val="dk1"/>
+          </a:lnRef>
+          <a:fillRef idx="0">
+            <a:schemeClr val="dk1"/>
+          </a:fillRef>
+          <a:effectRef idx="2">
+            <a:schemeClr val="dk1"/>
+          </a:effectRef>
+          <a:fontRef idx="minor">
+            <a:schemeClr val="tx1"/>
+          </a:fontRef>
+        </p:style>
+      </p:cxnSp>
+      <p:sp>
+        <p:nvSpPr>
+          <p:cNvPr id="30" name="TextBox 29"/>
+          <p:cNvSpPr txBox="1"/>
+          <p:nvPr/>
+        </p:nvSpPr>
+        <p:spPr>
+          <a:xfrm>
+            <a:off x="2017135" y="6104279"/>
+            <a:ext cx="2138599" cy="369332"/>
+          </a:xfrm>
+          <a:prstGeom prst="rect">
+            <a:avLst/>
+          </a:prstGeom>
+          <a:noFill/>
+        </p:spPr>
+        <p:txBody>
+          <a:bodyPr wrap="none" rtlCol="0">
+            <a:spAutoFit/>
+          </a:bodyPr>
+          <a:lstStyle/>
+          <a:p>
+            <a:r>
+              <a:rPr lang="en-US" b="1" dirty="0" smtClean="0"/>
+              <a:t>South Oriented Case</a:t>
+            </a:r>
+            <a:endParaRPr lang="en-US" b="1" dirty="0"/>
+          </a:p>
+        </p:txBody>
+      </p:sp>
+      <p:grpSp>
+        <p:nvGrpSpPr>
+          <p:cNvPr id="54" name="Group 53"/>
+          <p:cNvGrpSpPr/>
+          <p:nvPr/>
+        </p:nvGrpSpPr>
+        <p:grpSpPr>
+          <a:xfrm rot="5400000">
+            <a:off x="6670623" y="87256"/>
+            <a:ext cx="3505922" cy="5007811"/>
+            <a:chOff x="7268741" y="371977"/>
+            <a:chExt cx="3505922" cy="5007811"/>
+          </a:xfrm>
+        </p:grpSpPr>
+        <p:sp>
+          <p:nvSpPr>
+            <p:cNvPr id="31" name="Rectangle 30"/>
+            <p:cNvSpPr/>
+            <p:nvPr/>
+          </p:nvSpPr>
+          <p:spPr>
+            <a:xfrm>
+              <a:off x="8031463" y="371977"/>
+              <a:ext cx="2743200" cy="2743200"/>
+            </a:xfrm>
+            <a:prstGeom prst="rect">
+              <a:avLst/>
+            </a:prstGeom>
+          </p:spPr>
+          <p:style>
+            <a:lnRef idx="2">
+              <a:schemeClr val="accent2">
+                <a:shade val="50000"/>
+              </a:schemeClr>
+            </a:lnRef>
+            <a:fillRef idx="1">
+              <a:schemeClr val="accent2"/>
+            </a:fillRef>
+            <a:effectRef idx="0">
+              <a:schemeClr val="accent2"/>
+            </a:effectRef>
+            <a:fontRef idx="minor">
+              <a:schemeClr val="lt1"/>
+            </a:fontRef>
+          </p:style>
+          <p:txBody>
+            <a:bodyPr rtlCol="0" anchor="ctr"/>
+            <a:lstStyle/>
+            <a:p>
+              <a:pPr algn="ctr"/>
+              <a:endParaRPr lang="en-US"/>
+            </a:p>
+          </p:txBody>
+        </p:sp>
+        <p:grpSp>
+          <p:nvGrpSpPr>
+            <p:cNvPr id="32" name="Group 31"/>
+            <p:cNvGrpSpPr/>
+            <p:nvPr/>
+          </p:nvGrpSpPr>
+          <p:grpSpPr>
+            <a:xfrm>
+              <a:off x="8547148" y="2746877"/>
+              <a:ext cx="1816100" cy="2632911"/>
+              <a:chOff x="4851448" y="3644900"/>
+              <a:chExt cx="1816100" cy="2632911"/>
+            </a:xfrm>
+          </p:grpSpPr>
+          <p:sp>
+            <p:nvSpPr>
+              <p:cNvPr id="33" name="Rectangle 32"/>
+              <p:cNvSpPr/>
+              <p:nvPr/>
+            </p:nvSpPr>
+            <p:spPr>
+              <a:xfrm>
+                <a:off x="4851448" y="3644900"/>
+                <a:ext cx="1816100" cy="2632911"/>
+              </a:xfrm>
+              <a:prstGeom prst="rect">
+                <a:avLst/>
+              </a:prstGeom>
+              <a:gradFill flip="none" rotWithShape="1">
+                <a:gsLst>
+                  <a:gs pos="0">
+                    <a:schemeClr val="accent1">
+                      <a:lumMod val="67000"/>
+                    </a:schemeClr>
+                  </a:gs>
+                  <a:gs pos="48000">
+                    <a:schemeClr val="accent1">
+                      <a:lumMod val="97000"/>
+                      <a:lumOff val="3000"/>
+                    </a:schemeClr>
+                  </a:gs>
+                  <a:gs pos="100000">
+                    <a:schemeClr val="accent1">
+                      <a:lumMod val="60000"/>
+                      <a:lumOff val="40000"/>
+                    </a:schemeClr>
+                  </a:gs>
+                </a:gsLst>
+                <a:lin ang="16200000" scaled="1"/>
+                <a:tileRect/>
+              </a:gradFill>
+              <a:ln>
+                <a:noFill/>
+              </a:ln>
+            </p:spPr>
+            <p:style>
+              <a:lnRef idx="0">
+                <a:scrgbClr r="0" g="0" b="0"/>
+              </a:lnRef>
+              <a:fillRef idx="0">
+                <a:scrgbClr r="0" g="0" b="0"/>
+              </a:fillRef>
+              <a:effectRef idx="0">
+                <a:scrgbClr r="0" g="0" b="0"/>
+              </a:effectRef>
+              <a:fontRef idx="minor">
+                <a:schemeClr val="lt1"/>
+              </a:fontRef>
+            </p:style>
+            <p:txBody>
+              <a:bodyPr rtlCol="0" anchor="ctr"/>
+              <a:lstStyle/>
+              <a:p>
+                <a:pPr algn="ctr"/>
+                <a:endParaRPr lang="en-US"/>
+              </a:p>
+            </p:txBody>
+          </p:sp>
+          <p:sp>
+            <p:nvSpPr>
+              <p:cNvPr id="34" name="Rectangle 33"/>
+              <p:cNvSpPr/>
+              <p:nvPr/>
+            </p:nvSpPr>
+            <p:spPr>
+              <a:xfrm>
+                <a:off x="5033927" y="3644900"/>
+                <a:ext cx="52137" cy="2346158"/>
+              </a:xfrm>
+              <a:prstGeom prst="rect">
+                <a:avLst/>
+              </a:prstGeom>
+            </p:spPr>
+            <p:style>
+              <a:lnRef idx="2">
+                <a:schemeClr val="dk1">
+                  <a:shade val="50000"/>
+                </a:schemeClr>
+              </a:lnRef>
+              <a:fillRef idx="1">
+                <a:schemeClr val="dk1"/>
+              </a:fillRef>
+              <a:effectRef idx="0">
+                <a:schemeClr val="dk1"/>
+              </a:effectRef>
+              <a:fontRef idx="minor">
+                <a:schemeClr val="lt1"/>
+              </a:fontRef>
+            </p:style>
+            <p:txBody>
+              <a:bodyPr rtlCol="0" anchor="ctr"/>
+              <a:lstStyle/>
+              <a:p>
+                <a:pPr algn="ctr"/>
+                <a:endParaRPr lang="en-US"/>
+              </a:p>
+            </p:txBody>
+          </p:sp>
+          <p:sp>
+            <p:nvSpPr>
+              <p:cNvPr id="35" name="Rectangle 34"/>
+              <p:cNvSpPr/>
+              <p:nvPr/>
+            </p:nvSpPr>
+            <p:spPr>
+              <a:xfrm>
+                <a:off x="5226337" y="3644900"/>
+                <a:ext cx="52137" cy="2346158"/>
+              </a:xfrm>
+              <a:prstGeom prst="rect">
+                <a:avLst/>
+              </a:prstGeom>
+            </p:spPr>
+            <p:style>
+              <a:lnRef idx="2">
+                <a:schemeClr val="dk1">
+                  <a:shade val="50000"/>
+                </a:schemeClr>
+              </a:lnRef>
+              <a:fillRef idx="1">
+                <a:schemeClr val="dk1"/>
+              </a:fillRef>
+              <a:effectRef idx="0">
+                <a:schemeClr val="dk1"/>
+              </a:effectRef>
+              <a:fontRef idx="minor">
+                <a:schemeClr val="lt1"/>
+              </a:fontRef>
+            </p:style>
+            <p:txBody>
+              <a:bodyPr rtlCol="0" anchor="ctr"/>
+              <a:lstStyle/>
+              <a:p>
+                <a:pPr algn="ctr"/>
+                <a:endParaRPr lang="en-US"/>
+              </a:p>
+            </p:txBody>
+          </p:sp>
+          <p:sp>
+            <p:nvSpPr>
+              <p:cNvPr id="36" name="Rectangle 35"/>
+              <p:cNvSpPr/>
+              <p:nvPr/>
+            </p:nvSpPr>
+            <p:spPr>
+              <a:xfrm>
+                <a:off x="5418747" y="3644900"/>
+                <a:ext cx="52137" cy="2346158"/>
+              </a:xfrm>
+              <a:prstGeom prst="rect">
+                <a:avLst/>
+              </a:prstGeom>
+            </p:spPr>
+            <p:style>
+              <a:lnRef idx="2">
+                <a:schemeClr val="dk1">
+                  <a:shade val="50000"/>
+                </a:schemeClr>
+              </a:lnRef>
+              <a:fillRef idx="1">
+                <a:schemeClr val="dk1"/>
+              </a:fillRef>
+              <a:effectRef idx="0">
+                <a:schemeClr val="dk1"/>
+              </a:effectRef>
+              <a:fontRef idx="minor">
+                <a:schemeClr val="lt1"/>
+              </a:fontRef>
+            </p:style>
+            <p:txBody>
+              <a:bodyPr rtlCol="0" anchor="ctr"/>
+              <a:lstStyle/>
+              <a:p>
+                <a:pPr algn="ctr"/>
+                <a:endParaRPr lang="en-US"/>
+              </a:p>
+            </p:txBody>
+          </p:sp>
+          <p:sp>
+            <p:nvSpPr>
+              <p:cNvPr id="37" name="Rectangle 36"/>
+              <p:cNvSpPr/>
+              <p:nvPr/>
+            </p:nvSpPr>
+            <p:spPr>
+              <a:xfrm>
+                <a:off x="5611157" y="3644900"/>
+                <a:ext cx="52137" cy="2346158"/>
+              </a:xfrm>
+              <a:prstGeom prst="rect">
+                <a:avLst/>
+              </a:prstGeom>
+            </p:spPr>
+            <p:style>
+              <a:lnRef idx="2">
+                <a:schemeClr val="dk1">
+                  <a:shade val="50000"/>
+                </a:schemeClr>
+              </a:lnRef>
+              <a:fillRef idx="1">
+                <a:schemeClr val="dk1"/>
+              </a:fillRef>
+              <a:effectRef idx="0">
+                <a:schemeClr val="dk1"/>
+              </a:effectRef>
+              <a:fontRef idx="minor">
+                <a:schemeClr val="lt1"/>
+              </a:fontRef>
+            </p:style>
+            <p:txBody>
+              <a:bodyPr rtlCol="0" anchor="ctr"/>
+              <a:lstStyle/>
+              <a:p>
+                <a:pPr algn="ctr"/>
+                <a:endParaRPr lang="en-US"/>
+              </a:p>
+            </p:txBody>
+          </p:sp>
+          <p:sp>
+            <p:nvSpPr>
+              <p:cNvPr id="38" name="Rectangle 37"/>
+              <p:cNvSpPr/>
+              <p:nvPr/>
+            </p:nvSpPr>
+            <p:spPr>
+              <a:xfrm>
+                <a:off x="5803567" y="3644900"/>
+                <a:ext cx="52137" cy="2346158"/>
+              </a:xfrm>
+              <a:prstGeom prst="rect">
+                <a:avLst/>
+              </a:prstGeom>
+            </p:spPr>
+            <p:style>
+              <a:lnRef idx="2">
+                <a:schemeClr val="dk1">
+                  <a:shade val="50000"/>
+                </a:schemeClr>
+              </a:lnRef>
+              <a:fillRef idx="1">
+                <a:schemeClr val="dk1"/>
+              </a:fillRef>
+              <a:effectRef idx="0">
+                <a:schemeClr val="dk1"/>
+              </a:effectRef>
+              <a:fontRef idx="minor">
+                <a:schemeClr val="lt1"/>
+              </a:fontRef>
+            </p:style>
+            <p:txBody>
+              <a:bodyPr rtlCol="0" anchor="ctr"/>
+              <a:lstStyle/>
+              <a:p>
+                <a:pPr algn="ctr"/>
+                <a:endParaRPr lang="en-US"/>
+              </a:p>
+            </p:txBody>
+          </p:sp>
+          <p:sp>
+            <p:nvSpPr>
+              <p:cNvPr id="39" name="Rectangle 38"/>
+              <p:cNvSpPr/>
+              <p:nvPr/>
+            </p:nvSpPr>
+            <p:spPr>
+              <a:xfrm>
+                <a:off x="5995977" y="3644900"/>
+                <a:ext cx="52137" cy="2346158"/>
+              </a:xfrm>
+              <a:prstGeom prst="rect">
+                <a:avLst/>
+              </a:prstGeom>
+            </p:spPr>
+            <p:style>
+              <a:lnRef idx="2">
+                <a:schemeClr val="dk1">
+                  <a:shade val="50000"/>
+                </a:schemeClr>
+              </a:lnRef>
+              <a:fillRef idx="1">
+                <a:schemeClr val="dk1"/>
+              </a:fillRef>
+              <a:effectRef idx="0">
+                <a:schemeClr val="dk1"/>
+              </a:effectRef>
+              <a:fontRef idx="minor">
+                <a:schemeClr val="lt1"/>
+              </a:fontRef>
+            </p:style>
+            <p:txBody>
+              <a:bodyPr rtlCol="0" anchor="ctr"/>
+              <a:lstStyle/>
+              <a:p>
+                <a:pPr algn="ctr"/>
+                <a:endParaRPr lang="en-US"/>
+              </a:p>
+            </p:txBody>
+          </p:sp>
+          <p:sp>
+            <p:nvSpPr>
+              <p:cNvPr id="40" name="Rectangle 39"/>
+              <p:cNvSpPr/>
+              <p:nvPr/>
+            </p:nvSpPr>
+            <p:spPr>
+              <a:xfrm>
+                <a:off x="6188387" y="3644900"/>
+                <a:ext cx="52137" cy="2346158"/>
+              </a:xfrm>
+              <a:prstGeom prst="rect">
+                <a:avLst/>
+              </a:prstGeom>
+            </p:spPr>
+            <p:style>
+              <a:lnRef idx="2">
+                <a:schemeClr val="dk1">
+                  <a:shade val="50000"/>
+                </a:schemeClr>
+              </a:lnRef>
+              <a:fillRef idx="1">
+                <a:schemeClr val="dk1"/>
+              </a:fillRef>
+              <a:effectRef idx="0">
+                <a:schemeClr val="dk1"/>
+              </a:effectRef>
+              <a:fontRef idx="minor">
+                <a:schemeClr val="lt1"/>
+              </a:fontRef>
+            </p:style>
+            <p:txBody>
+              <a:bodyPr rtlCol="0" anchor="ctr"/>
+              <a:lstStyle/>
+              <a:p>
+                <a:pPr algn="ctr"/>
+                <a:endParaRPr lang="en-US"/>
+              </a:p>
+            </p:txBody>
+          </p:sp>
+          <p:sp>
+            <p:nvSpPr>
+              <p:cNvPr id="41" name="Rectangle 40"/>
+              <p:cNvSpPr/>
+              <p:nvPr/>
+            </p:nvSpPr>
+            <p:spPr>
+              <a:xfrm>
+                <a:off x="6380795" y="3644900"/>
+                <a:ext cx="52137" cy="2346158"/>
+              </a:xfrm>
+              <a:prstGeom prst="rect">
+                <a:avLst/>
+              </a:prstGeom>
+            </p:spPr>
+            <p:style>
+              <a:lnRef idx="2">
+                <a:schemeClr val="dk1">
+                  <a:shade val="50000"/>
+                </a:schemeClr>
+              </a:lnRef>
+              <a:fillRef idx="1">
+                <a:schemeClr val="dk1"/>
+              </a:fillRef>
+              <a:effectRef idx="0">
+                <a:schemeClr val="dk1"/>
+              </a:effectRef>
+              <a:fontRef idx="minor">
+                <a:schemeClr val="lt1"/>
+              </a:fontRef>
+            </p:style>
+            <p:txBody>
+              <a:bodyPr rtlCol="0" anchor="ctr"/>
+              <a:lstStyle/>
+              <a:p>
+                <a:pPr algn="ctr"/>
+                <a:endParaRPr lang="en-US"/>
+              </a:p>
+            </p:txBody>
+          </p:sp>
+        </p:grpSp>
+        <p:sp>
+          <p:nvSpPr>
+            <p:cNvPr id="42" name="Isosceles Triangle 41"/>
+            <p:cNvSpPr/>
+            <p:nvPr/>
+          </p:nvSpPr>
+          <p:spPr>
+            <a:xfrm>
+              <a:off x="8679495" y="2344154"/>
+              <a:ext cx="152400" cy="304800"/>
+            </a:xfrm>
+            <a:prstGeom prst="triangle">
+              <a:avLst/>
+            </a:prstGeom>
+          </p:spPr>
+          <p:style>
+            <a:lnRef idx="2">
+              <a:schemeClr val="accent6">
+                <a:shade val="50000"/>
+              </a:schemeClr>
+            </a:lnRef>
+            <a:fillRef idx="1">
+              <a:schemeClr val="accent6"/>
+            </a:fillRef>
+            <a:effectRef idx="0">
+              <a:schemeClr val="accent6"/>
+            </a:effectRef>
+            <a:fontRef idx="minor">
+              <a:schemeClr val="lt1"/>
+            </a:fontRef>
+          </p:style>
+          <p:txBody>
+            <a:bodyPr rtlCol="0" anchor="ctr"/>
+            <a:lstStyle/>
+            <a:p>
+              <a:pPr algn="ctr"/>
+              <a:endParaRPr lang="en-US"/>
+            </a:p>
+          </p:txBody>
+        </p:sp>
+        <p:sp>
+          <p:nvSpPr>
+            <p:cNvPr id="43" name="Isosceles Triangle 42"/>
+            <p:cNvSpPr/>
+            <p:nvPr/>
+          </p:nvSpPr>
+          <p:spPr>
+            <a:xfrm>
+              <a:off x="8871905" y="2344154"/>
+              <a:ext cx="152400" cy="304800"/>
+            </a:xfrm>
+            <a:prstGeom prst="triangle">
+              <a:avLst/>
+            </a:prstGeom>
+          </p:spPr>
+          <p:style>
+            <a:lnRef idx="2">
+              <a:schemeClr val="accent6">
+                <a:shade val="50000"/>
+              </a:schemeClr>
+            </a:lnRef>
+            <a:fillRef idx="1">
+              <a:schemeClr val="accent6"/>
+            </a:fillRef>
+            <a:effectRef idx="0">
+              <a:schemeClr val="accent6"/>
+            </a:effectRef>
+            <a:fontRef idx="minor">
+              <a:schemeClr val="lt1"/>
+            </a:fontRef>
+          </p:style>
+          <p:txBody>
+            <a:bodyPr rtlCol="0" anchor="ctr"/>
+            <a:lstStyle/>
+            <a:p>
+              <a:pPr algn="ctr"/>
+              <a:endParaRPr lang="en-US"/>
+            </a:p>
+          </p:txBody>
+        </p:sp>
+        <p:sp>
+          <p:nvSpPr>
+            <p:cNvPr id="44" name="Isosceles Triangle 43"/>
+            <p:cNvSpPr/>
+            <p:nvPr/>
+          </p:nvSpPr>
+          <p:spPr>
+            <a:xfrm>
+              <a:off x="9064315" y="2344154"/>
+              <a:ext cx="152400" cy="304800"/>
+            </a:xfrm>
+            <a:prstGeom prst="triangle">
+              <a:avLst/>
+            </a:prstGeom>
+          </p:spPr>
+          <p:style>
+            <a:lnRef idx="2">
+              <a:schemeClr val="accent6">
+                <a:shade val="50000"/>
+              </a:schemeClr>
+            </a:lnRef>
+            <a:fillRef idx="1">
+              <a:schemeClr val="accent6"/>
+            </a:fillRef>
+            <a:effectRef idx="0">
+              <a:schemeClr val="accent6"/>
+            </a:effectRef>
+            <a:fontRef idx="minor">
+              <a:schemeClr val="lt1"/>
+            </a:fontRef>
+          </p:style>
+          <p:txBody>
+            <a:bodyPr rtlCol="0" anchor="ctr"/>
+            <a:lstStyle/>
+            <a:p>
+              <a:pPr algn="ctr"/>
+              <a:endParaRPr lang="en-US"/>
+            </a:p>
+          </p:txBody>
+        </p:sp>
+        <p:sp>
+          <p:nvSpPr>
+            <p:cNvPr id="45" name="Isosceles Triangle 44"/>
+            <p:cNvSpPr/>
+            <p:nvPr/>
+          </p:nvSpPr>
+          <p:spPr>
+            <a:xfrm>
+              <a:off x="9256725" y="2344154"/>
+              <a:ext cx="152400" cy="304800"/>
+            </a:xfrm>
+            <a:prstGeom prst="triangle">
+              <a:avLst/>
+            </a:prstGeom>
+          </p:spPr>
+          <p:style>
+            <a:lnRef idx="2">
+              <a:schemeClr val="accent6">
+                <a:shade val="50000"/>
+              </a:schemeClr>
+            </a:lnRef>
+            <a:fillRef idx="1">
+              <a:schemeClr val="accent6"/>
+            </a:fillRef>
+            <a:effectRef idx="0">
+              <a:schemeClr val="accent6"/>
+            </a:effectRef>
+            <a:fontRef idx="minor">
+              <a:schemeClr val="lt1"/>
+            </a:fontRef>
+          </p:style>
+          <p:txBody>
+            <a:bodyPr rtlCol="0" anchor="ctr"/>
+            <a:lstStyle/>
+            <a:p>
+              <a:pPr algn="ctr"/>
+              <a:endParaRPr lang="en-US"/>
+            </a:p>
+          </p:txBody>
+        </p:sp>
+        <p:sp>
+          <p:nvSpPr>
+            <p:cNvPr id="46" name="Isosceles Triangle 45"/>
+            <p:cNvSpPr/>
+            <p:nvPr/>
+          </p:nvSpPr>
+          <p:spPr>
+            <a:xfrm>
+              <a:off x="9449135" y="2344154"/>
+              <a:ext cx="152400" cy="304800"/>
+            </a:xfrm>
+            <a:prstGeom prst="triangle">
+              <a:avLst/>
+            </a:prstGeom>
+          </p:spPr>
+          <p:style>
+            <a:lnRef idx="2">
+              <a:schemeClr val="accent6">
+                <a:shade val="50000"/>
+              </a:schemeClr>
+            </a:lnRef>
+            <a:fillRef idx="1">
+              <a:schemeClr val="accent6"/>
+            </a:fillRef>
+            <a:effectRef idx="0">
+              <a:schemeClr val="accent6"/>
+            </a:effectRef>
+            <a:fontRef idx="minor">
+              <a:schemeClr val="lt1"/>
+            </a:fontRef>
+          </p:style>
+          <p:txBody>
+            <a:bodyPr rtlCol="0" anchor="ctr"/>
+            <a:lstStyle/>
+            <a:p>
+              <a:pPr algn="ctr"/>
+              <a:endParaRPr lang="en-US"/>
+            </a:p>
+          </p:txBody>
+        </p:sp>
+        <p:sp>
+          <p:nvSpPr>
+            <p:cNvPr id="47" name="Isosceles Triangle 46"/>
+            <p:cNvSpPr/>
+            <p:nvPr/>
+          </p:nvSpPr>
+          <p:spPr>
+            <a:xfrm>
+              <a:off x="9641545" y="2344154"/>
+              <a:ext cx="152400" cy="304800"/>
+            </a:xfrm>
+            <a:prstGeom prst="triangle">
+              <a:avLst/>
+            </a:prstGeom>
+          </p:spPr>
+          <p:style>
+            <a:lnRef idx="2">
+              <a:schemeClr val="accent6">
+                <a:shade val="50000"/>
+              </a:schemeClr>
+            </a:lnRef>
+            <a:fillRef idx="1">
+              <a:schemeClr val="accent6"/>
+            </a:fillRef>
+            <a:effectRef idx="0">
+              <a:schemeClr val="accent6"/>
+            </a:effectRef>
+            <a:fontRef idx="minor">
+              <a:schemeClr val="lt1"/>
+            </a:fontRef>
+          </p:style>
+          <p:txBody>
+            <a:bodyPr rtlCol="0" anchor="ctr"/>
+            <a:lstStyle/>
+            <a:p>
+              <a:pPr algn="ctr"/>
+              <a:endParaRPr lang="en-US"/>
+            </a:p>
+          </p:txBody>
+        </p:sp>
+        <p:sp>
+          <p:nvSpPr>
+            <p:cNvPr id="48" name="Isosceles Triangle 47"/>
+            <p:cNvSpPr/>
+            <p:nvPr/>
+          </p:nvSpPr>
+          <p:spPr>
+            <a:xfrm>
+              <a:off x="9833955" y="2344154"/>
+              <a:ext cx="152400" cy="304800"/>
+            </a:xfrm>
+            <a:prstGeom prst="triangle">
+              <a:avLst/>
+            </a:prstGeom>
+          </p:spPr>
+          <p:style>
+            <a:lnRef idx="2">
+              <a:schemeClr val="accent6">
+                <a:shade val="50000"/>
+              </a:schemeClr>
+            </a:lnRef>
+            <a:fillRef idx="1">
+              <a:schemeClr val="accent6"/>
+            </a:fillRef>
+            <a:effectRef idx="0">
+              <a:schemeClr val="accent6"/>
+            </a:effectRef>
+            <a:fontRef idx="minor">
+              <a:schemeClr val="lt1"/>
+            </a:fontRef>
+          </p:style>
+          <p:txBody>
+            <a:bodyPr rtlCol="0" anchor="ctr"/>
+            <a:lstStyle/>
+            <a:p>
+              <a:pPr algn="ctr"/>
+              <a:endParaRPr lang="en-US"/>
+            </a:p>
+          </p:txBody>
+        </p:sp>
+        <p:sp>
+          <p:nvSpPr>
+            <p:cNvPr id="49" name="Isosceles Triangle 48"/>
+            <p:cNvSpPr/>
+            <p:nvPr/>
+          </p:nvSpPr>
+          <p:spPr>
+            <a:xfrm>
+              <a:off x="10026363" y="2344154"/>
+              <a:ext cx="152400" cy="304800"/>
+            </a:xfrm>
+            <a:prstGeom prst="triangle">
+              <a:avLst/>
+            </a:prstGeom>
+          </p:spPr>
+          <p:style>
+            <a:lnRef idx="2">
+              <a:schemeClr val="accent6">
+                <a:shade val="50000"/>
+              </a:schemeClr>
+            </a:lnRef>
+            <a:fillRef idx="1">
+              <a:schemeClr val="accent6"/>
+            </a:fillRef>
+            <a:effectRef idx="0">
+              <a:schemeClr val="accent6"/>
+            </a:effectRef>
+            <a:fontRef idx="minor">
+              <a:schemeClr val="lt1"/>
+            </a:fontRef>
+          </p:style>
+          <p:txBody>
+            <a:bodyPr rtlCol="0" anchor="ctr"/>
+            <a:lstStyle/>
+            <a:p>
+              <a:pPr algn="ctr"/>
+              <a:endParaRPr lang="en-US"/>
+            </a:p>
+          </p:txBody>
+        </p:sp>
+        <p:sp>
+          <p:nvSpPr>
+            <p:cNvPr id="50" name="TextBox 49"/>
+            <p:cNvSpPr txBox="1"/>
+            <p:nvPr/>
+          </p:nvSpPr>
+          <p:spPr>
+            <a:xfrm rot="16200000">
+              <a:off x="6682106" y="3735747"/>
+              <a:ext cx="1542602" cy="369332"/>
+            </a:xfrm>
+            <a:prstGeom prst="rect">
+              <a:avLst/>
+            </a:prstGeom>
+            <a:noFill/>
+          </p:spPr>
+          <p:txBody>
+            <a:bodyPr wrap="none" rtlCol="0">
+              <a:spAutoFit/>
+            </a:bodyPr>
+            <a:lstStyle/>
+            <a:p>
+              <a:r>
+                <a:rPr lang="en-US" dirty="0" smtClean="0"/>
+                <a:t>Leftmost Fiber</a:t>
+              </a:r>
+              <a:endParaRPr lang="en-US" dirty="0"/>
+            </a:p>
+          </p:txBody>
+        </p:sp>
+        <p:cxnSp>
+          <p:nvCxnSpPr>
+            <p:cNvPr id="51" name="Straight Arrow Connector 50"/>
+            <p:cNvCxnSpPr/>
+            <p:nvPr/>
+          </p:nvCxnSpPr>
+          <p:spPr>
+            <a:xfrm flipV="1">
+              <a:off x="8234909" y="3919956"/>
+              <a:ext cx="456618" cy="457"/>
+            </a:xfrm>
+            <a:prstGeom prst="straightConnector1">
+              <a:avLst/>
+            </a:prstGeom>
+            <a:ln>
+              <a:tailEnd type="triangle"/>
+            </a:ln>
+          </p:spPr>
+          <p:style>
+            <a:lnRef idx="3">
+              <a:schemeClr val="dk1"/>
+            </a:lnRef>
+            <a:fillRef idx="0">
+              <a:schemeClr val="dk1"/>
+            </a:fillRef>
+            <a:effectRef idx="2">
+              <a:schemeClr val="dk1"/>
+            </a:effectRef>
+            <a:fontRef idx="minor">
+              <a:schemeClr val="tx1"/>
+            </a:fontRef>
+          </p:style>
+        </p:cxnSp>
+        <p:sp>
+          <p:nvSpPr>
+            <p:cNvPr id="52" name="TextBox 51"/>
+            <p:cNvSpPr txBox="1"/>
+            <p:nvPr/>
+          </p:nvSpPr>
+          <p:spPr>
+            <a:xfrm rot="16200000">
+              <a:off x="6745544" y="2311888"/>
+              <a:ext cx="2061590" cy="369332"/>
+            </a:xfrm>
+            <a:prstGeom prst="rect">
+              <a:avLst/>
+            </a:prstGeom>
+            <a:noFill/>
+          </p:spPr>
+          <p:txBody>
+            <a:bodyPr wrap="none" rtlCol="0">
+              <a:spAutoFit/>
+            </a:bodyPr>
+            <a:lstStyle/>
+            <a:p>
+              <a:r>
+                <a:rPr lang="en-US" dirty="0" smtClean="0"/>
+                <a:t>Defining Coordinate</a:t>
+              </a:r>
+              <a:endParaRPr lang="en-US" dirty="0"/>
+            </a:p>
+          </p:txBody>
+        </p:sp>
+        <p:cxnSp>
+          <p:nvCxnSpPr>
+            <p:cNvPr id="53" name="Straight Arrow Connector 52"/>
+            <p:cNvCxnSpPr/>
+            <p:nvPr/>
+          </p:nvCxnSpPr>
+          <p:spPr>
+            <a:xfrm flipV="1">
+              <a:off x="8288037" y="2561754"/>
+              <a:ext cx="456618" cy="457"/>
+            </a:xfrm>
+            <a:prstGeom prst="straightConnector1">
+              <a:avLst/>
+            </a:prstGeom>
+            <a:ln>
+              <a:tailEnd type="triangle"/>
+            </a:ln>
+          </p:spPr>
+          <p:style>
+            <a:lnRef idx="3">
+              <a:schemeClr val="dk1"/>
+            </a:lnRef>
+            <a:fillRef idx="0">
+              <a:schemeClr val="dk1"/>
+            </a:fillRef>
+            <a:effectRef idx="2">
+              <a:schemeClr val="dk1"/>
+            </a:effectRef>
+            <a:fontRef idx="minor">
+              <a:schemeClr val="tx1"/>
+            </a:fontRef>
+          </p:style>
+        </p:cxnSp>
+      </p:grpSp>
+      <p:sp>
+        <p:nvSpPr>
+          <p:cNvPr id="55" name="TextBox 54"/>
+          <p:cNvSpPr txBox="1"/>
+          <p:nvPr/>
+        </p:nvSpPr>
+        <p:spPr>
+          <a:xfrm>
+            <a:off x="7733613" y="6104279"/>
+            <a:ext cx="2065309" cy="369332"/>
+          </a:xfrm>
+          <a:prstGeom prst="rect">
+            <a:avLst/>
+          </a:prstGeom>
+          <a:noFill/>
+        </p:spPr>
+        <p:txBody>
+          <a:bodyPr wrap="none" rtlCol="0">
+            <a:spAutoFit/>
+          </a:bodyPr>
+          <a:lstStyle/>
+          <a:p>
+            <a:r>
+              <a:rPr lang="en-US" b="1" dirty="0" smtClean="0"/>
+              <a:t>West Oriented Case</a:t>
+            </a:r>
+            <a:endParaRPr lang="en-US" b="1" dirty="0"/>
+          </a:p>
+        </p:txBody>
+      </p:sp>
+    </p:spTree>
+    <p:extLst>
+      <p:ext uri="{BB962C8B-B14F-4D97-AF65-F5344CB8AC3E}">
+        <p14:creationId xmlns:p14="http://schemas.microsoft.com/office/powerpoint/2010/main" val="1652515751"/>
       </p:ext>
     </p:extLst>
   </p:cSld>

</xml_diff>